<commit_message>
fix explain of hyper parameter
</commit_message>
<xml_diff>
--- a/para-dep.pptx
+++ b/para-dep.pptx
@@ -3383,8 +3383,8 @@
           <a:chExt cx="0" cy="0"/>
         </a:xfrm>
       </p:grpSpPr>
-      <mc:AlternateContent xmlns:mc="http://schemas.openxmlformats.org/markup-compatibility/2006">
-        <mc:Choice xmlns:a14="http://schemas.microsoft.com/office/drawing/2010/main" Requires="a14">
+      <mc:AlternateContent xmlns:mc="http://schemas.openxmlformats.org/markup-compatibility/2006" xmlns:a14="http://schemas.microsoft.com/office/drawing/2010/main">
+        <mc:Choice Requires="a14">
           <p:sp>
             <p:nvSpPr>
               <p:cNvPr id="7" name="テキスト ボックス 6"/>
@@ -3433,7 +3433,7 @@
             </p:txBody>
           </p:sp>
         </mc:Choice>
-        <mc:Fallback>
+        <mc:Fallback xmlns="">
           <p:sp>
             <p:nvSpPr>
               <p:cNvPr id="7" name="テキスト ボックス 6"/>
@@ -3477,8 +3477,8 @@
           </p:sp>
         </mc:Fallback>
       </mc:AlternateContent>
-      <mc:AlternateContent xmlns:mc="http://schemas.openxmlformats.org/markup-compatibility/2006">
-        <mc:Choice xmlns:a14="http://schemas.microsoft.com/office/drawing/2010/main" Requires="a14">
+      <mc:AlternateContent xmlns:mc="http://schemas.openxmlformats.org/markup-compatibility/2006" xmlns:a14="http://schemas.microsoft.com/office/drawing/2010/main">
+        <mc:Choice Requires="a14">
           <p:sp>
             <p:nvSpPr>
               <p:cNvPr id="8" name="テキスト ボックス 7"/>
@@ -3665,7 +3665,7 @@
             </p:txBody>
           </p:sp>
         </mc:Choice>
-        <mc:Fallback>
+        <mc:Fallback xmlns="">
           <p:sp>
             <p:nvSpPr>
               <p:cNvPr id="8" name="テキスト ボックス 7"/>
@@ -3709,8 +3709,8 @@
           </p:sp>
         </mc:Fallback>
       </mc:AlternateContent>
-      <mc:AlternateContent xmlns:mc="http://schemas.openxmlformats.org/markup-compatibility/2006">
-        <mc:Choice xmlns:a14="http://schemas.microsoft.com/office/drawing/2010/main" Requires="a14">
+      <mc:AlternateContent xmlns:mc="http://schemas.openxmlformats.org/markup-compatibility/2006" xmlns:a14="http://schemas.microsoft.com/office/drawing/2010/main">
+        <mc:Choice Requires="a14">
           <p:sp>
             <p:nvSpPr>
               <p:cNvPr id="9" name="テキスト ボックス 8"/>
@@ -3891,7 +3891,7 @@
             </p:txBody>
           </p:sp>
         </mc:Choice>
-        <mc:Fallback>
+        <mc:Fallback xmlns="">
           <p:sp>
             <p:nvSpPr>
               <p:cNvPr id="9" name="テキスト ボックス 8"/>
@@ -3935,8 +3935,8 @@
           </p:sp>
         </mc:Fallback>
       </mc:AlternateContent>
-      <mc:AlternateContent xmlns:mc="http://schemas.openxmlformats.org/markup-compatibility/2006">
-        <mc:Choice xmlns:a14="http://schemas.microsoft.com/office/drawing/2010/main" Requires="a14">
+      <mc:AlternateContent xmlns:mc="http://schemas.openxmlformats.org/markup-compatibility/2006" xmlns:a14="http://schemas.microsoft.com/office/drawing/2010/main">
+        <mc:Choice Requires="a14">
           <p:sp>
             <p:nvSpPr>
               <p:cNvPr id="10" name="テキスト ボックス 9"/>
@@ -4087,7 +4087,7 @@
             </p:txBody>
           </p:sp>
         </mc:Choice>
-        <mc:Fallback>
+        <mc:Fallback xmlns="">
           <p:sp>
             <p:nvSpPr>
               <p:cNvPr id="10" name="テキスト ボックス 9"/>
@@ -4131,8 +4131,8 @@
           </p:sp>
         </mc:Fallback>
       </mc:AlternateContent>
-      <mc:AlternateContent xmlns:mc="http://schemas.openxmlformats.org/markup-compatibility/2006">
-        <mc:Choice xmlns:a14="http://schemas.microsoft.com/office/drawing/2010/main" Requires="a14">
+      <mc:AlternateContent xmlns:mc="http://schemas.openxmlformats.org/markup-compatibility/2006" xmlns:a14="http://schemas.microsoft.com/office/drawing/2010/main">
+        <mc:Choice Requires="a14">
           <p:sp>
             <p:nvSpPr>
               <p:cNvPr id="11" name="テキスト ボックス 10"/>
@@ -4181,7 +4181,7 @@
             </p:txBody>
           </p:sp>
         </mc:Choice>
-        <mc:Fallback>
+        <mc:Fallback xmlns="">
           <p:sp>
             <p:nvSpPr>
               <p:cNvPr id="11" name="テキスト ボックス 10"/>
@@ -4225,8 +4225,8 @@
           </p:sp>
         </mc:Fallback>
       </mc:AlternateContent>
-      <mc:AlternateContent xmlns:mc="http://schemas.openxmlformats.org/markup-compatibility/2006">
-        <mc:Choice xmlns:a14="http://schemas.microsoft.com/office/drawing/2010/main" Requires="a14">
+      <mc:AlternateContent xmlns:mc="http://schemas.openxmlformats.org/markup-compatibility/2006" xmlns:a14="http://schemas.microsoft.com/office/drawing/2010/main">
+        <mc:Choice Requires="a14">
           <p:sp>
             <p:nvSpPr>
               <p:cNvPr id="12" name="テキスト ボックス 11"/>
@@ -4275,7 +4275,7 @@
             </p:txBody>
           </p:sp>
         </mc:Choice>
-        <mc:Fallback>
+        <mc:Fallback xmlns="">
           <p:sp>
             <p:nvSpPr>
               <p:cNvPr id="12" name="テキスト ボックス 11"/>
@@ -4330,6 +4330,100 @@
             <p:spPr>
               <a:xfrm>
                 <a:off x="2466019" y="891504"/>
+                <a:ext cx="191945" cy="184650"/>
+              </a:xfrm>
+              <a:prstGeom prst="rect">
+                <a:avLst/>
+              </a:prstGeom>
+              <a:noFill/>
+              <a:ln w="3175">
+                <a:solidFill>
+                  <a:schemeClr val="tx1"/>
+                </a:solidFill>
+              </a:ln>
+            </p:spPr>
+            <p:txBody>
+              <a:bodyPr wrap="none" lIns="45705" tIns="22852" rIns="45705" bIns="22852" rtlCol="0">
+                <a:spAutoFit/>
+              </a:bodyPr>
+              <a:lstStyle/>
+              <a:p>
+                <a:pPr/>
+                <a14:m>
+                  <m:oMathPara xmlns:m="http://schemas.openxmlformats.org/officeDocument/2006/math">
+                    <m:oMathParaPr>
+                      <m:jc m:val="centerGroup"/>
+                    </m:oMathParaPr>
+                    <m:oMath xmlns:m="http://schemas.openxmlformats.org/officeDocument/2006/math">
+                      <m:r>
+                        <a:rPr kumimoji="1" lang="en-US" altLang="ja-JP" b="0" i="1" smtClean="0">
+                          <a:latin typeface="Cambria Math"/>
+                        </a:rPr>
+                        <m:t>𝛽</m:t>
+                      </m:r>
+                    </m:oMath>
+                  </m:oMathPara>
+                </a14:m>
+                <a:endParaRPr kumimoji="1" lang="en-US" altLang="ja-JP" b="0" smtClean="0"/>
+              </a:p>
+            </p:txBody>
+          </p:sp>
+        </mc:Choice>
+        <mc:Fallback>
+          <p:sp>
+            <p:nvSpPr>
+              <p:cNvPr id="13" name="テキスト ボックス 12"/>
+              <p:cNvSpPr txBox="1">
+                <a:spLocks noRot="1" noChangeAspect="1" noMove="1" noResize="1" noEditPoints="1" noAdjustHandles="1" noChangeArrowheads="1" noChangeShapeType="1" noTextEdit="1"/>
+              </p:cNvSpPr>
+              <p:nvPr/>
+            </p:nvSpPr>
+            <p:spPr>
+              <a:xfrm>
+                <a:off x="2466019" y="891504"/>
+                <a:ext cx="191945" cy="184650"/>
+              </a:xfrm>
+              <a:prstGeom prst="rect">
+                <a:avLst/>
+              </a:prstGeom>
+              <a:blipFill rotWithShape="1">
+                <a:blip r:embed="rId8"/>
+                <a:stretch>
+                  <a:fillRect b="-6250"/>
+                </a:stretch>
+              </a:blipFill>
+              <a:ln w="3175">
+                <a:solidFill>
+                  <a:schemeClr val="tx1"/>
+                </a:solidFill>
+              </a:ln>
+            </p:spPr>
+            <p:txBody>
+              <a:bodyPr/>
+              <a:lstStyle/>
+              <a:p>
+                <a:r>
+                  <a:rPr lang="ja-JP" altLang="en-US">
+                    <a:noFill/>
+                  </a:rPr>
+                  <a:t> </a:t>
+                </a:r>
+              </a:p>
+            </p:txBody>
+          </p:sp>
+        </mc:Fallback>
+      </mc:AlternateContent>
+      <mc:AlternateContent xmlns:mc="http://schemas.openxmlformats.org/markup-compatibility/2006">
+        <mc:Choice xmlns:a14="http://schemas.microsoft.com/office/drawing/2010/main" Requires="a14">
+          <p:sp>
+            <p:nvSpPr>
+              <p:cNvPr id="14" name="テキスト ボックス 13"/>
+              <p:cNvSpPr txBox="1"/>
+              <p:nvPr/>
+            </p:nvSpPr>
+            <p:spPr>
+              <a:xfrm>
+                <a:off x="2898066" y="891504"/>
                 <a:ext cx="165656" cy="184650"/>
               </a:xfrm>
               <a:prstGeom prst="rect">
@@ -4372,100 +4466,6 @@
         <mc:Fallback>
           <p:sp>
             <p:nvSpPr>
-              <p:cNvPr id="13" name="テキスト ボックス 12"/>
-              <p:cNvSpPr txBox="1">
-                <a:spLocks noRot="1" noChangeAspect="1" noMove="1" noResize="1" noEditPoints="1" noAdjustHandles="1" noChangeArrowheads="1" noChangeShapeType="1" noTextEdit="1"/>
-              </p:cNvSpPr>
-              <p:nvPr/>
-            </p:nvSpPr>
-            <p:spPr>
-              <a:xfrm>
-                <a:off x="2466019" y="891504"/>
-                <a:ext cx="165656" cy="184650"/>
-              </a:xfrm>
-              <a:prstGeom prst="rect">
-                <a:avLst/>
-              </a:prstGeom>
-              <a:blipFill rotWithShape="1">
-                <a:blip r:embed="rId8"/>
-                <a:stretch>
-                  <a:fillRect/>
-                </a:stretch>
-              </a:blipFill>
-              <a:ln w="3175">
-                <a:solidFill>
-                  <a:schemeClr val="tx1"/>
-                </a:solidFill>
-              </a:ln>
-            </p:spPr>
-            <p:txBody>
-              <a:bodyPr/>
-              <a:lstStyle/>
-              <a:p>
-                <a:r>
-                  <a:rPr lang="ja-JP" altLang="en-US">
-                    <a:noFill/>
-                  </a:rPr>
-                  <a:t> </a:t>
-                </a:r>
-              </a:p>
-            </p:txBody>
-          </p:sp>
-        </mc:Fallback>
-      </mc:AlternateContent>
-      <mc:AlternateContent xmlns:mc="http://schemas.openxmlformats.org/markup-compatibility/2006">
-        <mc:Choice xmlns:a14="http://schemas.microsoft.com/office/drawing/2010/main" Requires="a14">
-          <p:sp>
-            <p:nvSpPr>
-              <p:cNvPr id="14" name="テキスト ボックス 13"/>
-              <p:cNvSpPr txBox="1"/>
-              <p:nvPr/>
-            </p:nvSpPr>
-            <p:spPr>
-              <a:xfrm>
-                <a:off x="2898066" y="891504"/>
-                <a:ext cx="191945" cy="184650"/>
-              </a:xfrm>
-              <a:prstGeom prst="rect">
-                <a:avLst/>
-              </a:prstGeom>
-              <a:noFill/>
-              <a:ln w="3175">
-                <a:solidFill>
-                  <a:schemeClr val="tx1"/>
-                </a:solidFill>
-              </a:ln>
-            </p:spPr>
-            <p:txBody>
-              <a:bodyPr wrap="none" lIns="45705" tIns="22852" rIns="45705" bIns="22852" rtlCol="0">
-                <a:spAutoFit/>
-              </a:bodyPr>
-              <a:lstStyle/>
-              <a:p>
-                <a:pPr/>
-                <a14:m>
-                  <m:oMathPara xmlns:m="http://schemas.openxmlformats.org/officeDocument/2006/math">
-                    <m:oMathParaPr>
-                      <m:jc m:val="centerGroup"/>
-                    </m:oMathParaPr>
-                    <m:oMath xmlns:m="http://schemas.openxmlformats.org/officeDocument/2006/math">
-                      <m:r>
-                        <a:rPr kumimoji="1" lang="en-US" altLang="ja-JP" b="0" i="1" smtClean="0">
-                          <a:latin typeface="Cambria Math"/>
-                        </a:rPr>
-                        <m:t>𝛽</m:t>
-                      </m:r>
-                    </m:oMath>
-                  </m:oMathPara>
-                </a14:m>
-                <a:endParaRPr kumimoji="1" lang="en-US" altLang="ja-JP" b="0" smtClean="0"/>
-              </a:p>
-            </p:txBody>
-          </p:sp>
-        </mc:Choice>
-        <mc:Fallback>
-          <p:sp>
-            <p:nvSpPr>
               <p:cNvPr id="14" name="テキスト ボックス 13"/>
               <p:cNvSpPr txBox="1">
                 <a:spLocks noRot="1" noChangeAspect="1" noMove="1" noResize="1" noEditPoints="1" noAdjustHandles="1" noChangeArrowheads="1" noChangeShapeType="1" noTextEdit="1"/>
@@ -4475,7 +4475,7 @@
             <p:spPr>
               <a:xfrm>
                 <a:off x="2898066" y="891504"/>
-                <a:ext cx="191945" cy="184650"/>
+                <a:ext cx="165656" cy="184650"/>
               </a:xfrm>
               <a:prstGeom prst="rect">
                 <a:avLst/>
@@ -4483,7 +4483,7 @@
               <a:blipFill rotWithShape="1">
                 <a:blip r:embed="rId9"/>
                 <a:stretch>
-                  <a:fillRect b="-6250"/>
+                  <a:fillRect/>
                 </a:stretch>
               </a:blipFill>
               <a:ln w="3175">
@@ -4621,8 +4621,8 @@
           </a:fontRef>
         </p:style>
       </p:cxnSp>
-      <mc:AlternateContent xmlns:mc="http://schemas.openxmlformats.org/markup-compatibility/2006">
-        <mc:Choice xmlns:a14="http://schemas.microsoft.com/office/drawing/2010/main" Requires="a14">
+      <mc:AlternateContent xmlns:mc="http://schemas.openxmlformats.org/markup-compatibility/2006" xmlns:a14="http://schemas.microsoft.com/office/drawing/2010/main">
+        <mc:Choice Requires="a14">
           <p:sp>
             <p:nvSpPr>
               <p:cNvPr id="33" name="テキスト ボックス 32"/>
@@ -4713,7 +4713,7 @@
             </p:txBody>
           </p:sp>
         </mc:Choice>
-        <mc:Fallback>
+        <mc:Fallback xmlns="">
           <p:sp>
             <p:nvSpPr>
               <p:cNvPr id="33" name="テキスト ボックス 32"/>
@@ -4757,8 +4757,8 @@
           </p:sp>
         </mc:Fallback>
       </mc:AlternateContent>
-      <mc:AlternateContent xmlns:mc="http://schemas.openxmlformats.org/markup-compatibility/2006">
-        <mc:Choice xmlns:a14="http://schemas.microsoft.com/office/drawing/2010/main" Requires="a14">
+      <mc:AlternateContent xmlns:mc="http://schemas.openxmlformats.org/markup-compatibility/2006" xmlns:a14="http://schemas.microsoft.com/office/drawing/2010/main">
+        <mc:Choice Requires="a14">
           <p:sp>
             <p:nvSpPr>
               <p:cNvPr id="34" name="テキスト ボックス 33"/>
@@ -4838,7 +4838,7 @@
             </p:txBody>
           </p:sp>
         </mc:Choice>
-        <mc:Fallback>
+        <mc:Fallback xmlns="">
           <p:sp>
             <p:nvSpPr>
               <p:cNvPr id="34" name="テキスト ボックス 33"/>
@@ -4959,8 +4959,8 @@
           </a:fontRef>
         </p:style>
       </p:cxnSp>
-      <mc:AlternateContent xmlns:mc="http://schemas.openxmlformats.org/markup-compatibility/2006">
-        <mc:Choice xmlns:a14="http://schemas.microsoft.com/office/drawing/2010/main" Requires="a14">
+      <mc:AlternateContent xmlns:mc="http://schemas.openxmlformats.org/markup-compatibility/2006" xmlns:a14="http://schemas.microsoft.com/office/drawing/2010/main">
+        <mc:Choice Requires="a14">
           <p:sp>
             <p:nvSpPr>
               <p:cNvPr id="46" name="テキスト ボックス 45"/>
@@ -5092,7 +5092,7 @@
             </p:txBody>
           </p:sp>
         </mc:Choice>
-        <mc:Fallback>
+        <mc:Fallback xmlns="">
           <p:sp>
             <p:nvSpPr>
               <p:cNvPr id="46" name="テキスト ボックス 45"/>
@@ -5225,12 +5225,12 @@
         </p:nvCxnSpPr>
         <p:spPr>
           <a:xfrm rot="16200000" flipH="1">
-            <a:off x="2771443" y="853558"/>
-            <a:ext cx="12700" cy="445192"/>
+            <a:off x="2771443" y="866703"/>
+            <a:ext cx="12700" cy="418902"/>
           </a:xfrm>
           <a:prstGeom prst="bentConnector3">
             <a:avLst>
-              <a:gd name="adj1" fmla="val 900000"/>
+              <a:gd name="adj1" fmla="val 5741772"/>
             </a:avLst>
           </a:prstGeom>
           <a:ln w="3175">
@@ -5262,12 +5262,12 @@
         </p:nvCxnSpPr>
         <p:spPr>
           <a:xfrm flipV="1">
-            <a:off x="1346101" y="1184750"/>
-            <a:ext cx="1431692" cy="1326358"/>
+            <a:off x="1346101" y="1811084"/>
+            <a:ext cx="1431692" cy="700024"/>
           </a:xfrm>
           <a:prstGeom prst="bentConnector3">
             <a:avLst>
-              <a:gd name="adj1" fmla="val 100030"/>
+              <a:gd name="adj1" fmla="val 99923"/>
             </a:avLst>
           </a:prstGeom>
           <a:ln w="3175">
@@ -5362,8 +5362,8 @@
           </a:fontRef>
         </p:style>
       </p:cxnSp>
-      <mc:AlternateContent xmlns:mc="http://schemas.openxmlformats.org/markup-compatibility/2006">
-        <mc:Choice xmlns:a14="http://schemas.microsoft.com/office/drawing/2010/main" Requires="a14">
+      <mc:AlternateContent xmlns:mc="http://schemas.openxmlformats.org/markup-compatibility/2006" xmlns:a14="http://schemas.microsoft.com/office/drawing/2010/main">
+        <mc:Choice Requires="a14">
           <p:sp>
             <p:nvSpPr>
               <p:cNvPr id="105" name="テキスト ボックス 104"/>
@@ -5497,7 +5497,7 @@
             </p:txBody>
           </p:sp>
         </mc:Choice>
-        <mc:Fallback>
+        <mc:Fallback xmlns="">
           <p:sp>
             <p:nvSpPr>
               <p:cNvPr id="105" name="テキスト ボックス 104"/>
@@ -5658,8 +5658,8 @@
           </a:fontRef>
         </p:style>
       </p:cxnSp>
-      <mc:AlternateContent xmlns:mc="http://schemas.openxmlformats.org/markup-compatibility/2006">
-        <mc:Choice xmlns:a14="http://schemas.microsoft.com/office/drawing/2010/main" Requires="a14">
+      <mc:AlternateContent xmlns:mc="http://schemas.openxmlformats.org/markup-compatibility/2006" xmlns:a14="http://schemas.microsoft.com/office/drawing/2010/main">
+        <mc:Choice Requires="a14">
           <p:sp>
             <p:nvSpPr>
               <p:cNvPr id="133" name="テキスト ボックス 132"/>
@@ -5687,7 +5687,6 @@
               </a:bodyPr>
               <a:lstStyle/>
               <a:p>
-                <a:pPr/>
                 <a14:m>
                   <m:oMath xmlns:m="http://schemas.openxmlformats.org/officeDocument/2006/math">
                     <m:f>
@@ -5870,7 +5869,7 @@
             </p:txBody>
           </p:sp>
         </mc:Choice>
-        <mc:Fallback>
+        <mc:Fallback xmlns="">
           <p:sp>
             <p:nvSpPr>
               <p:cNvPr id="133" name="テキスト ボックス 132"/>
@@ -5993,14 +5992,14 @@
         <p:nvCxnSpPr>
           <p:cNvPr id="137" name="カギ線コネクタ 136"/>
           <p:cNvCxnSpPr>
-            <a:endCxn id="14" idx="0"/>
+            <a:endCxn id="13" idx="0"/>
           </p:cNvCxnSpPr>
           <p:nvPr/>
         </p:nvCxnSpPr>
         <p:spPr>
           <a:xfrm rot="10800000" flipV="1">
-            <a:off x="2994039" y="743306"/>
-            <a:ext cx="201288" cy="148198"/>
+            <a:off x="2561993" y="743306"/>
+            <a:ext cx="633339" cy="148198"/>
           </a:xfrm>
           <a:prstGeom prst="bentConnector2">
             <a:avLst/>
@@ -6121,6 +6120,42 @@
             <a:solidFill>
               <a:schemeClr val="tx1"/>
             </a:solidFill>
+          </a:ln>
+        </p:spPr>
+        <p:style>
+          <a:lnRef idx="1">
+            <a:schemeClr val="accent1"/>
+          </a:lnRef>
+          <a:fillRef idx="0">
+            <a:schemeClr val="accent1"/>
+          </a:fillRef>
+          <a:effectRef idx="0">
+            <a:schemeClr val="accent1"/>
+          </a:effectRef>
+          <a:fontRef idx="minor">
+            <a:schemeClr val="tx1"/>
+          </a:fontRef>
+        </p:style>
+      </p:cxnSp>
+      <p:cxnSp>
+        <p:nvCxnSpPr>
+          <p:cNvPr id="40" name="直線コネクタ 39"/>
+          <p:cNvCxnSpPr/>
+          <p:nvPr/>
+        </p:nvCxnSpPr>
+        <p:spPr>
+          <a:xfrm>
+            <a:off x="1493912" y="1624191"/>
+            <a:ext cx="1074430" cy="0"/>
+          </a:xfrm>
+          <a:prstGeom prst="line">
+            <a:avLst/>
+          </a:prstGeom>
+          <a:ln w="3175">
+            <a:solidFill>
+              <a:schemeClr val="tx1"/>
+            </a:solidFill>
+            <a:tailEnd type="none" w="sm" len="sm"/>
           </a:ln>
         </p:spPr>
         <p:style>

</xml_diff>